<commit_message>
changed powerpoint and removed auto reload
</commit_message>
<xml_diff>
--- a/Haustür.pptx
+++ b/Haustür.pptx
@@ -3945,7 +3945,7 @@
         </p:blipFill>
         <p:spPr bwMode="auto">
           <a:xfrm>
-            <a:off x="327464" y="2243635"/>
+            <a:off x="1153632" y="2233068"/>
             <a:ext cx="2947044" cy="1768226"/>
           </a:xfrm>
           <a:prstGeom prst="rect">
@@ -4276,53 +4276,6 @@
           <a:xfrm>
             <a:off x="9122761" y="4980483"/>
             <a:ext cx="1486505" cy="1671013"/>
-          </a:xfrm>
-          <a:prstGeom prst="rect">
-            <a:avLst/>
-          </a:prstGeom>
-          <a:noFill/>
-          <a:extLst>
-            <a:ext uri="{909E8E84-426E-40DD-AFC4-6F175D3DCCD1}">
-              <a14:hiddenFill xmlns:a14="http://schemas.microsoft.com/office/drawing/2010/main">
-                <a:solidFill>
-                  <a:srgbClr val="FFFFFF"/>
-                </a:solidFill>
-              </a14:hiddenFill>
-            </a:ext>
-          </a:extLst>
-        </p:spPr>
-      </p:pic>
-      <p:pic>
-        <p:nvPicPr>
-          <p:cNvPr id="1050" name="Picture 26" descr="css, document, file, format, sass, scss icon">
-            <a:extLst>
-              <a:ext uri="{FF2B5EF4-FFF2-40B4-BE49-F238E27FC236}">
-                <a16:creationId xmlns:a16="http://schemas.microsoft.com/office/drawing/2014/main" id="{9E5CA2D9-D08C-4BE4-8A31-34038944029E}"/>
-              </a:ext>
-            </a:extLst>
-          </p:cNvPr>
-          <p:cNvPicPr>
-            <a:picLocks noChangeAspect="1" noChangeArrowheads="1"/>
-          </p:cNvPicPr>
-          <p:nvPr/>
-        </p:nvPicPr>
-        <p:blipFill>
-          <a:blip r:embed="rId10">
-            <a:extLst>
-              <a:ext uri="{28A0092B-C50C-407E-A947-70E740481C1C}">
-                <a14:useLocalDpi xmlns:a14="http://schemas.microsoft.com/office/drawing/2010/main" val="0"/>
-              </a:ext>
-            </a:extLst>
-          </a:blip>
-          <a:srcRect/>
-          <a:stretch>
-            <a:fillRect/>
-          </a:stretch>
-        </p:blipFill>
-        <p:spPr bwMode="auto">
-          <a:xfrm>
-            <a:off x="2642280" y="2258898"/>
-            <a:ext cx="1562094" cy="1562094"/>
           </a:xfrm>
           <a:prstGeom prst="rect">
             <a:avLst/>

</xml_diff>